<commit_message>
update documentation and version for release
</commit_message>
<xml_diff>
--- a/docs/images/abmexample.pptx
+++ b/docs/images/abmexample.pptx
@@ -197,7 +197,7 @@
           <a:p>
             <a:fld id="{CB0FEEBC-9D12-43CB-BEF3-A9ED6ACE25C3}" type="datetimeFigureOut">
               <a:rPr lang="en-US" smtClean="0"/>
-              <a:t>5/18/2018</a:t>
+              <a:t>7/15/2018</a:t>
             </a:fld>
             <a:endParaRPr lang="en-US"/>
           </a:p>
@@ -679,7 +679,7 @@
           <a:p>
             <a:fld id="{0DECCE1E-41C5-476A-AB8D-4C2AE2DBCC24}" type="datetimeFigureOut">
               <a:rPr lang="en-US" smtClean="0"/>
-              <a:t>5/18/2018</a:t>
+              <a:t>7/15/2018</a:t>
             </a:fld>
             <a:endParaRPr lang="en-US"/>
           </a:p>
@@ -849,7 +849,7 @@
           <a:p>
             <a:fld id="{0DECCE1E-41C5-476A-AB8D-4C2AE2DBCC24}" type="datetimeFigureOut">
               <a:rPr lang="en-US" smtClean="0"/>
-              <a:t>5/18/2018</a:t>
+              <a:t>7/15/2018</a:t>
             </a:fld>
             <a:endParaRPr lang="en-US"/>
           </a:p>
@@ -1029,7 +1029,7 @@
           <a:p>
             <a:fld id="{0DECCE1E-41C5-476A-AB8D-4C2AE2DBCC24}" type="datetimeFigureOut">
               <a:rPr lang="en-US" smtClean="0"/>
-              <a:t>5/18/2018</a:t>
+              <a:t>7/15/2018</a:t>
             </a:fld>
             <a:endParaRPr lang="en-US"/>
           </a:p>
@@ -1199,7 +1199,7 @@
           <a:p>
             <a:fld id="{0DECCE1E-41C5-476A-AB8D-4C2AE2DBCC24}" type="datetimeFigureOut">
               <a:rPr lang="en-US" smtClean="0"/>
-              <a:t>5/18/2018</a:t>
+              <a:t>7/15/2018</a:t>
             </a:fld>
             <a:endParaRPr lang="en-US"/>
           </a:p>
@@ -1443,7 +1443,7 @@
           <a:p>
             <a:fld id="{0DECCE1E-41C5-476A-AB8D-4C2AE2DBCC24}" type="datetimeFigureOut">
               <a:rPr lang="en-US" smtClean="0"/>
-              <a:t>5/18/2018</a:t>
+              <a:t>7/15/2018</a:t>
             </a:fld>
             <a:endParaRPr lang="en-US"/>
           </a:p>
@@ -1675,7 +1675,7 @@
           <a:p>
             <a:fld id="{0DECCE1E-41C5-476A-AB8D-4C2AE2DBCC24}" type="datetimeFigureOut">
               <a:rPr lang="en-US" smtClean="0"/>
-              <a:t>5/18/2018</a:t>
+              <a:t>7/15/2018</a:t>
             </a:fld>
             <a:endParaRPr lang="en-US"/>
           </a:p>
@@ -2042,7 +2042,7 @@
           <a:p>
             <a:fld id="{0DECCE1E-41C5-476A-AB8D-4C2AE2DBCC24}" type="datetimeFigureOut">
               <a:rPr lang="en-US" smtClean="0"/>
-              <a:t>5/18/2018</a:t>
+              <a:t>7/15/2018</a:t>
             </a:fld>
             <a:endParaRPr lang="en-US"/>
           </a:p>
@@ -2160,7 +2160,7 @@
           <a:p>
             <a:fld id="{0DECCE1E-41C5-476A-AB8D-4C2AE2DBCC24}" type="datetimeFigureOut">
               <a:rPr lang="en-US" smtClean="0"/>
-              <a:t>5/18/2018</a:t>
+              <a:t>7/15/2018</a:t>
             </a:fld>
             <a:endParaRPr lang="en-US"/>
           </a:p>
@@ -2255,7 +2255,7 @@
           <a:p>
             <a:fld id="{0DECCE1E-41C5-476A-AB8D-4C2AE2DBCC24}" type="datetimeFigureOut">
               <a:rPr lang="en-US" smtClean="0"/>
-              <a:t>5/18/2018</a:t>
+              <a:t>7/15/2018</a:t>
             </a:fld>
             <a:endParaRPr lang="en-US"/>
           </a:p>
@@ -2532,7 +2532,7 @@
           <a:p>
             <a:fld id="{0DECCE1E-41C5-476A-AB8D-4C2AE2DBCC24}" type="datetimeFigureOut">
               <a:rPr lang="en-US" smtClean="0"/>
-              <a:t>5/18/2018</a:t>
+              <a:t>7/15/2018</a:t>
             </a:fld>
             <a:endParaRPr lang="en-US"/>
           </a:p>
@@ -2789,7 +2789,7 @@
           <a:p>
             <a:fld id="{0DECCE1E-41C5-476A-AB8D-4C2AE2DBCC24}" type="datetimeFigureOut">
               <a:rPr lang="en-US" smtClean="0"/>
-              <a:t>5/18/2018</a:t>
+              <a:t>7/15/2018</a:t>
             </a:fld>
             <a:endParaRPr lang="en-US"/>
           </a:p>
@@ -3002,7 +3002,7 @@
           <a:p>
             <a:fld id="{0DECCE1E-41C5-476A-AB8D-4C2AE2DBCC24}" type="datetimeFigureOut">
               <a:rPr lang="en-US" smtClean="0"/>
-              <a:t>5/18/2018</a:t>
+              <a:t>7/15/2018</a:t>
             </a:fld>
             <a:endParaRPr lang="en-US"/>
           </a:p>
@@ -5371,8 +5371,8 @@
         </p:nvSpPr>
         <p:spPr>
           <a:xfrm>
-            <a:off x="2543501" y="3908542"/>
-            <a:ext cx="1929375" cy="307548"/>
+            <a:off x="366443" y="3920118"/>
+            <a:ext cx="8413838" cy="289628"/>
           </a:xfrm>
           <a:prstGeom prst="roundRect">
             <a:avLst/>
@@ -5410,7 +5410,7 @@
             <a:pPr algn="ctr"/>
             <a:r>
               <a:rPr lang="en-US" sz="1200" b="1" dirty="0"/>
-              <a:t>Mode Choice </a:t>
+              <a:t>Mode</a:t>
             </a:r>
           </a:p>
         </p:txBody>
@@ -5426,14 +5426,13 @@
           </p:cNvPr>
           <p:cNvCxnSpPr>
             <a:cxnSpLocks/>
-            <a:endCxn id="164" idx="0"/>
           </p:cNvCxnSpPr>
           <p:nvPr/>
         </p:nvCxnSpPr>
         <p:spPr>
-          <a:xfrm>
+          <a:xfrm flipH="1">
             <a:off x="3508189" y="3711616"/>
-            <a:ext cx="0" cy="196926"/>
+            <a:ext cx="2" cy="203018"/>
           </a:xfrm>
           <a:prstGeom prst="straightConnector1">
             <a:avLst/>
@@ -5524,7 +5523,7 @@
         <p:spPr>
           <a:xfrm>
             <a:off x="1349179" y="3704494"/>
-            <a:ext cx="0" cy="647026"/>
+            <a:ext cx="0" cy="204048"/>
           </a:xfrm>
           <a:prstGeom prst="straightConnector1">
             <a:avLst/>
@@ -5563,14 +5562,13 @@
           <p:cNvCxnSpPr>
             <a:cxnSpLocks/>
             <a:stCxn id="153" idx="2"/>
-            <a:endCxn id="176" idx="0"/>
           </p:cNvCxnSpPr>
           <p:nvPr/>
         </p:nvCxnSpPr>
         <p:spPr>
           <a:xfrm>
             <a:off x="5667199" y="3712330"/>
-            <a:ext cx="0" cy="639190"/>
+            <a:ext cx="0" cy="196212"/>
           </a:xfrm>
           <a:prstGeom prst="straightConnector1">
             <a:avLst/>
@@ -5597,227 +5595,6 @@
           </a:fontRef>
         </p:style>
       </p:cxnSp>
-      <p:sp>
-        <p:nvSpPr>
-          <p:cNvPr id="176" name="Rounded Rectangle 255">
-            <a:extLst>
-              <a:ext uri="{FF2B5EF4-FFF2-40B4-BE49-F238E27FC236}">
-                <a16:creationId xmlns:a16="http://schemas.microsoft.com/office/drawing/2014/main" id="{521EAF77-5EB5-4BAA-A4A1-976D0BB0B91D}"/>
-              </a:ext>
-            </a:extLst>
-          </p:cNvPr>
-          <p:cNvSpPr/>
-          <p:nvPr/>
-        </p:nvSpPr>
-        <p:spPr>
-          <a:xfrm>
-            <a:off x="4702511" y="4351520"/>
-            <a:ext cx="1929375" cy="307548"/>
-          </a:xfrm>
-          <a:prstGeom prst="roundRect">
-            <a:avLst/>
-          </a:prstGeom>
-          <a:solidFill>
-            <a:schemeClr val="accent2">
-              <a:lumMod val="60000"/>
-              <a:lumOff val="40000"/>
-            </a:schemeClr>
-          </a:solidFill>
-          <a:ln w="28575">
-            <a:solidFill>
-              <a:schemeClr val="tx1"/>
-            </a:solidFill>
-          </a:ln>
-        </p:spPr>
-        <p:style>
-          <a:lnRef idx="1">
-            <a:schemeClr val="accent1"/>
-          </a:lnRef>
-          <a:fillRef idx="2">
-            <a:schemeClr val="accent1"/>
-          </a:fillRef>
-          <a:effectRef idx="1">
-            <a:schemeClr val="accent1"/>
-          </a:effectRef>
-          <a:fontRef idx="minor">
-            <a:schemeClr val="dk1"/>
-          </a:fontRef>
-        </p:style>
-        <p:txBody>
-          <a:bodyPr rtlCol="0" anchor="ctr"/>
-          <a:lstStyle/>
-          <a:p>
-            <a:pPr algn="ctr"/>
-            <a:r>
-              <a:rPr lang="en-US" sz="1200" b="1" dirty="0"/>
-              <a:t>Mode Choice </a:t>
-            </a:r>
-          </a:p>
-        </p:txBody>
-      </p:sp>
-      <p:sp>
-        <p:nvSpPr>
-          <p:cNvPr id="177" name="Rounded Rectangle 255">
-            <a:extLst>
-              <a:ext uri="{FF2B5EF4-FFF2-40B4-BE49-F238E27FC236}">
-                <a16:creationId xmlns:a16="http://schemas.microsoft.com/office/drawing/2014/main" id="{0D77F1DA-C0AE-496F-BEB1-0D8572ACA85F}"/>
-              </a:ext>
-            </a:extLst>
-          </p:cNvPr>
-          <p:cNvSpPr/>
-          <p:nvPr/>
-        </p:nvSpPr>
-        <p:spPr>
-          <a:xfrm>
-            <a:off x="384490" y="4337658"/>
-            <a:ext cx="1929375" cy="307548"/>
-          </a:xfrm>
-          <a:prstGeom prst="roundRect">
-            <a:avLst/>
-          </a:prstGeom>
-          <a:solidFill>
-            <a:schemeClr val="accent2">
-              <a:lumMod val="60000"/>
-              <a:lumOff val="40000"/>
-            </a:schemeClr>
-          </a:solidFill>
-          <a:ln w="28575">
-            <a:solidFill>
-              <a:schemeClr val="tx1"/>
-            </a:solidFill>
-          </a:ln>
-        </p:spPr>
-        <p:style>
-          <a:lnRef idx="1">
-            <a:schemeClr val="accent1"/>
-          </a:lnRef>
-          <a:fillRef idx="2">
-            <a:schemeClr val="accent1"/>
-          </a:fillRef>
-          <a:effectRef idx="1">
-            <a:schemeClr val="accent1"/>
-          </a:effectRef>
-          <a:fontRef idx="minor">
-            <a:schemeClr val="dk1"/>
-          </a:fontRef>
-        </p:style>
-        <p:txBody>
-          <a:bodyPr rtlCol="0" anchor="ctr"/>
-          <a:lstStyle/>
-          <a:p>
-            <a:pPr algn="ctr"/>
-            <a:r>
-              <a:rPr lang="en-US" sz="1200" b="1" dirty="0"/>
-              <a:t>Mode Choice </a:t>
-            </a:r>
-          </a:p>
-        </p:txBody>
-      </p:sp>
-      <p:cxnSp>
-        <p:nvCxnSpPr>
-          <p:cNvPr id="178" name="Straight Arrow Connector 177">
-            <a:extLst>
-              <a:ext uri="{FF2B5EF4-FFF2-40B4-BE49-F238E27FC236}">
-                <a16:creationId xmlns:a16="http://schemas.microsoft.com/office/drawing/2014/main" id="{54E243BF-4D1D-4DBF-A06D-9E1890560D84}"/>
-              </a:ext>
-            </a:extLst>
-          </p:cNvPr>
-          <p:cNvCxnSpPr>
-            <a:cxnSpLocks/>
-            <a:stCxn id="176" idx="1"/>
-            <a:endCxn id="177" idx="3"/>
-          </p:cNvCxnSpPr>
-          <p:nvPr/>
-        </p:nvCxnSpPr>
-        <p:spPr>
-          <a:xfrm flipH="1" flipV="1">
-            <a:off x="2313865" y="4491432"/>
-            <a:ext cx="2388646" cy="13862"/>
-          </a:xfrm>
-          <a:prstGeom prst="straightConnector1">
-            <a:avLst/>
-          </a:prstGeom>
-          <a:ln w="28575">
-            <a:solidFill>
-              <a:schemeClr val="tx1"/>
-            </a:solidFill>
-            <a:prstDash val="dash"/>
-            <a:tailEnd type="none"/>
-          </a:ln>
-        </p:spPr>
-        <p:style>
-          <a:lnRef idx="1">
-            <a:schemeClr val="dk1"/>
-          </a:lnRef>
-          <a:fillRef idx="0">
-            <a:schemeClr val="dk1"/>
-          </a:fillRef>
-          <a:effectRef idx="0">
-            <a:schemeClr val="dk1"/>
-          </a:effectRef>
-          <a:fontRef idx="minor">
-            <a:schemeClr val="tx1"/>
-          </a:fontRef>
-        </p:style>
-      </p:cxnSp>
-      <p:sp>
-        <p:nvSpPr>
-          <p:cNvPr id="179" name="Rounded Rectangle 255">
-            <a:extLst>
-              <a:ext uri="{FF2B5EF4-FFF2-40B4-BE49-F238E27FC236}">
-                <a16:creationId xmlns:a16="http://schemas.microsoft.com/office/drawing/2014/main" id="{C7CA53E4-8FA4-495C-AB19-18E86162CA86}"/>
-              </a:ext>
-            </a:extLst>
-          </p:cNvPr>
-          <p:cNvSpPr/>
-          <p:nvPr/>
-        </p:nvSpPr>
-        <p:spPr>
-          <a:xfrm>
-            <a:off x="6848182" y="3908542"/>
-            <a:ext cx="1929375" cy="307548"/>
-          </a:xfrm>
-          <a:prstGeom prst="roundRect">
-            <a:avLst/>
-          </a:prstGeom>
-          <a:solidFill>
-            <a:schemeClr val="accent2">
-              <a:lumMod val="60000"/>
-              <a:lumOff val="40000"/>
-            </a:schemeClr>
-          </a:solidFill>
-          <a:ln w="28575">
-            <a:solidFill>
-              <a:schemeClr val="tx1"/>
-            </a:solidFill>
-          </a:ln>
-        </p:spPr>
-        <p:style>
-          <a:lnRef idx="1">
-            <a:schemeClr val="accent1"/>
-          </a:lnRef>
-          <a:fillRef idx="2">
-            <a:schemeClr val="accent1"/>
-          </a:fillRef>
-          <a:effectRef idx="1">
-            <a:schemeClr val="accent1"/>
-          </a:effectRef>
-          <a:fontRef idx="minor">
-            <a:schemeClr val="dk1"/>
-          </a:fontRef>
-        </p:style>
-        <p:txBody>
-          <a:bodyPr rtlCol="0" anchor="ctr"/>
-          <a:lstStyle/>
-          <a:p>
-            <a:pPr algn="ctr"/>
-            <a:r>
-              <a:rPr lang="en-US" sz="1200" b="1" dirty="0"/>
-              <a:t>Mode Choice </a:t>
-            </a:r>
-          </a:p>
-        </p:txBody>
-      </p:sp>
       <p:cxnSp>
         <p:nvCxnSpPr>
           <p:cNvPr id="180" name="Straight Arrow Connector 179">
@@ -5829,7 +5606,6 @@
           </p:cNvPr>
           <p:cNvCxnSpPr>
             <a:cxnSpLocks/>
-            <a:endCxn id="179" idx="0"/>
           </p:cNvCxnSpPr>
           <p:nvPr/>
         </p:nvCxnSpPr>
@@ -5877,7 +5653,7 @@
         </p:nvSpPr>
         <p:spPr>
           <a:xfrm>
-            <a:off x="3308126" y="5597122"/>
+            <a:off x="3297529" y="4960599"/>
             <a:ext cx="2543456" cy="310432"/>
           </a:xfrm>
           <a:prstGeom prst="roundRect">
@@ -5936,8 +5712,8 @@
         </p:nvCxnSpPr>
         <p:spPr>
           <a:xfrm flipH="1">
-            <a:off x="4579854" y="5272587"/>
-            <a:ext cx="2743" cy="324535"/>
+            <a:off x="4569257" y="4745393"/>
+            <a:ext cx="2743" cy="215206"/>
           </a:xfrm>
           <a:prstGeom prst="straightConnector1">
             <a:avLst/>
@@ -5978,7 +5754,7 @@
         </p:nvSpPr>
         <p:spPr>
           <a:xfrm>
-            <a:off x="374299" y="4946302"/>
+            <a:off x="363702" y="4419108"/>
             <a:ext cx="8416596" cy="326285"/>
           </a:xfrm>
           <a:prstGeom prst="roundRect">
@@ -6036,7 +5812,7 @@
         </p:nvSpPr>
         <p:spPr>
           <a:xfrm>
-            <a:off x="3308126" y="6115730"/>
+            <a:off x="3297529" y="5479207"/>
             <a:ext cx="2543456" cy="310432"/>
           </a:xfrm>
           <a:prstGeom prst="roundRect">
@@ -6095,7 +5871,7 @@
         </p:nvCxnSpPr>
         <p:spPr>
           <a:xfrm>
-            <a:off x="4579854" y="5907554"/>
+            <a:off x="4569257" y="5271031"/>
             <a:ext cx="0" cy="208176"/>
           </a:xfrm>
           <a:prstGeom prst="straightConnector1">
@@ -6137,7 +5913,7 @@
         </p:nvSpPr>
         <p:spPr>
           <a:xfrm>
-            <a:off x="3308126" y="6623088"/>
+            <a:off x="3297529" y="5986565"/>
             <a:ext cx="2543455" cy="307548"/>
           </a:xfrm>
           <a:prstGeom prst="roundRect">
@@ -6196,7 +5972,7 @@
         </p:nvCxnSpPr>
         <p:spPr>
           <a:xfrm>
-            <a:off x="4579854" y="6426162"/>
+            <a:off x="4569257" y="5789639"/>
             <a:ext cx="0" cy="196926"/>
           </a:xfrm>
           <a:prstGeom prst="straightConnector1">
@@ -6238,7 +6014,7 @@
         </p:nvSpPr>
         <p:spPr>
           <a:xfrm>
-            <a:off x="3308126" y="7127562"/>
+            <a:off x="3297529" y="6491039"/>
             <a:ext cx="2543454" cy="307548"/>
           </a:xfrm>
           <a:prstGeom prst="roundRect">
@@ -6297,53 +6073,8 @@
         </p:nvCxnSpPr>
         <p:spPr>
           <a:xfrm flipH="1">
-            <a:off x="4579853" y="6930636"/>
+            <a:off x="4569256" y="6294113"/>
             <a:ext cx="1" cy="196926"/>
-          </a:xfrm>
-          <a:prstGeom prst="straightConnector1">
-            <a:avLst/>
-          </a:prstGeom>
-          <a:ln w="28575">
-            <a:solidFill>
-              <a:schemeClr val="tx1"/>
-            </a:solidFill>
-            <a:tailEnd type="arrow"/>
-          </a:ln>
-        </p:spPr>
-        <p:style>
-          <a:lnRef idx="1">
-            <a:schemeClr val="dk1"/>
-          </a:lnRef>
-          <a:fillRef idx="0">
-            <a:schemeClr val="dk1"/>
-          </a:fillRef>
-          <a:effectRef idx="0">
-            <a:schemeClr val="dk1"/>
-          </a:effectRef>
-          <a:fontRef idx="minor">
-            <a:schemeClr val="tx1"/>
-          </a:fontRef>
-        </p:style>
-      </p:cxnSp>
-      <p:cxnSp>
-        <p:nvCxnSpPr>
-          <p:cNvPr id="193" name="Straight Arrow Connector 192">
-            <a:extLst>
-              <a:ext uri="{FF2B5EF4-FFF2-40B4-BE49-F238E27FC236}">
-                <a16:creationId xmlns:a16="http://schemas.microsoft.com/office/drawing/2014/main" id="{BE30AD40-97FD-4461-8842-A28FFD6B8714}"/>
-              </a:ext>
-            </a:extLst>
-          </p:cNvPr>
-          <p:cNvCxnSpPr>
-            <a:cxnSpLocks/>
-            <a:stCxn id="177" idx="2"/>
-          </p:cNvCxnSpPr>
-          <p:nvPr/>
-        </p:nvCxnSpPr>
-        <p:spPr>
-          <a:xfrm>
-            <a:off x="1349178" y="4645206"/>
-            <a:ext cx="13340" cy="301096"/>
           </a:xfrm>
           <a:prstGeom prst="straightConnector1">
             <a:avLst/>
@@ -6382,103 +6113,14 @@
           <p:cNvCxnSpPr>
             <a:cxnSpLocks/>
             <a:stCxn id="164" idx="2"/>
+            <a:endCxn id="183" idx="0"/>
           </p:cNvCxnSpPr>
           <p:nvPr/>
         </p:nvCxnSpPr>
         <p:spPr>
           <a:xfrm flipH="1">
-            <a:off x="3508186" y="4216090"/>
-            <a:ext cx="3" cy="714884"/>
-          </a:xfrm>
-          <a:prstGeom prst="straightConnector1">
-            <a:avLst/>
-          </a:prstGeom>
-          <a:ln w="28575">
-            <a:solidFill>
-              <a:schemeClr val="tx1"/>
-            </a:solidFill>
-            <a:tailEnd type="arrow"/>
-          </a:ln>
-        </p:spPr>
-        <p:style>
-          <a:lnRef idx="1">
-            <a:schemeClr val="dk1"/>
-          </a:lnRef>
-          <a:fillRef idx="0">
-            <a:schemeClr val="dk1"/>
-          </a:fillRef>
-          <a:effectRef idx="0">
-            <a:schemeClr val="dk1"/>
-          </a:effectRef>
-          <a:fontRef idx="minor">
-            <a:schemeClr val="tx1"/>
-          </a:fontRef>
-        </p:style>
-      </p:cxnSp>
-      <p:cxnSp>
-        <p:nvCxnSpPr>
-          <p:cNvPr id="199" name="Straight Arrow Connector 198">
-            <a:extLst>
-              <a:ext uri="{FF2B5EF4-FFF2-40B4-BE49-F238E27FC236}">
-                <a16:creationId xmlns:a16="http://schemas.microsoft.com/office/drawing/2014/main" id="{08DB013F-7D06-48F1-ABCE-7B25C82AFA89}"/>
-              </a:ext>
-            </a:extLst>
-          </p:cNvPr>
-          <p:cNvCxnSpPr>
-            <a:cxnSpLocks/>
-            <a:stCxn id="176" idx="2"/>
-          </p:cNvCxnSpPr>
-          <p:nvPr/>
-        </p:nvCxnSpPr>
-        <p:spPr>
-          <a:xfrm flipH="1">
-            <a:off x="5667195" y="4659068"/>
-            <a:ext cx="4" cy="287234"/>
-          </a:xfrm>
-          <a:prstGeom prst="straightConnector1">
-            <a:avLst/>
-          </a:prstGeom>
-          <a:ln w="28575">
-            <a:solidFill>
-              <a:schemeClr val="tx1"/>
-            </a:solidFill>
-            <a:tailEnd type="arrow"/>
-          </a:ln>
-        </p:spPr>
-        <p:style>
-          <a:lnRef idx="1">
-            <a:schemeClr val="dk1"/>
-          </a:lnRef>
-          <a:fillRef idx="0">
-            <a:schemeClr val="dk1"/>
-          </a:fillRef>
-          <a:effectRef idx="0">
-            <a:schemeClr val="dk1"/>
-          </a:effectRef>
-          <a:fontRef idx="minor">
-            <a:schemeClr val="tx1"/>
-          </a:fontRef>
-        </p:style>
-      </p:cxnSp>
-      <p:cxnSp>
-        <p:nvCxnSpPr>
-          <p:cNvPr id="202" name="Straight Arrow Connector 201">
-            <a:extLst>
-              <a:ext uri="{FF2B5EF4-FFF2-40B4-BE49-F238E27FC236}">
-                <a16:creationId xmlns:a16="http://schemas.microsoft.com/office/drawing/2014/main" id="{ACBAAC08-5554-42FF-B901-AEA0CB9D9A54}"/>
-              </a:ext>
-            </a:extLst>
-          </p:cNvPr>
-          <p:cNvCxnSpPr>
-            <a:cxnSpLocks/>
-            <a:stCxn id="179" idx="2"/>
-          </p:cNvCxnSpPr>
-          <p:nvPr/>
-        </p:nvCxnSpPr>
-        <p:spPr>
-          <a:xfrm>
-            <a:off x="7812870" y="4216090"/>
-            <a:ext cx="0" cy="730212"/>
+            <a:off x="4572000" y="4209746"/>
+            <a:ext cx="1362" cy="209362"/>
           </a:xfrm>
           <a:prstGeom prst="straightConnector1">
             <a:avLst/>
@@ -6519,7 +6161,7 @@
         </p:nvSpPr>
         <p:spPr>
           <a:xfrm>
-            <a:off x="3294130" y="7586313"/>
+            <a:off x="3297529" y="6971829"/>
             <a:ext cx="2543454" cy="307548"/>
           </a:xfrm>
           <a:prstGeom prst="roundRect">
@@ -6577,9 +6219,9 @@
           <p:nvPr/>
         </p:nvCxnSpPr>
         <p:spPr>
-          <a:xfrm flipH="1">
-            <a:off x="4565857" y="7435110"/>
-            <a:ext cx="13996" cy="151203"/>
+          <a:xfrm>
+            <a:off x="4569256" y="6798587"/>
+            <a:ext cx="0" cy="173242"/>
           </a:xfrm>
           <a:prstGeom prst="straightConnector1">
             <a:avLst/>
@@ -6606,40 +6248,6 @@
           </a:fontRef>
         </p:style>
       </p:cxnSp>
-      <p:sp>
-        <p:nvSpPr>
-          <p:cNvPr id="211" name="Rectangle 210">
-            <a:extLst>
-              <a:ext uri="{FF2B5EF4-FFF2-40B4-BE49-F238E27FC236}">
-                <a16:creationId xmlns:a16="http://schemas.microsoft.com/office/drawing/2014/main" id="{766A21B2-0A10-4F25-B17A-A02FA80C3B4E}"/>
-              </a:ext>
-            </a:extLst>
-          </p:cNvPr>
-          <p:cNvSpPr/>
-          <p:nvPr/>
-        </p:nvSpPr>
-        <p:spPr>
-          <a:xfrm>
-            <a:off x="2284691" y="4462452"/>
-            <a:ext cx="1066978" cy="276999"/>
-          </a:xfrm>
-          <a:prstGeom prst="rect">
-            <a:avLst/>
-          </a:prstGeom>
-        </p:spPr>
-        <p:txBody>
-          <a:bodyPr wrap="square">
-            <a:spAutoFit/>
-          </a:bodyPr>
-          <a:lstStyle/>
-          <a:p>
-            <a:r>
-              <a:rPr lang="en-US" sz="1200" b="1" dirty="0"/>
-              <a:t>shared model</a:t>
-            </a:r>
-          </a:p>
-        </p:txBody>
-      </p:sp>
       <p:sp>
         <p:nvSpPr>
           <p:cNvPr id="213" name="Rounded Rectangle 255">
@@ -6654,7 +6262,7 @@
         </p:nvSpPr>
         <p:spPr>
           <a:xfrm>
-            <a:off x="7135808" y="5853130"/>
+            <a:off x="7125211" y="5216607"/>
             <a:ext cx="1697746" cy="2040731"/>
           </a:xfrm>
           <a:prstGeom prst="roundRect">
@@ -6706,7 +6314,7 @@
         </p:nvSpPr>
         <p:spPr>
           <a:xfrm>
-            <a:off x="7224996" y="5943804"/>
+            <a:off x="7214399" y="5307281"/>
             <a:ext cx="1516543" cy="321981"/>
           </a:xfrm>
           <a:prstGeom prst="roundRect">
@@ -6764,7 +6372,7 @@
         </p:nvSpPr>
         <p:spPr>
           <a:xfrm>
-            <a:off x="7224996" y="6322791"/>
+            <a:off x="7214399" y="5686268"/>
             <a:ext cx="1516543" cy="321981"/>
           </a:xfrm>
           <a:prstGeom prst="roundRect">
@@ -6822,7 +6430,7 @@
         </p:nvSpPr>
         <p:spPr>
           <a:xfrm>
-            <a:off x="7224994" y="6699950"/>
+            <a:off x="7214397" y="6063427"/>
             <a:ext cx="1516543" cy="321981"/>
           </a:xfrm>
           <a:prstGeom prst="roundRect">
@@ -6880,7 +6488,7 @@
         </p:nvSpPr>
         <p:spPr>
           <a:xfrm>
-            <a:off x="7210998" y="7094070"/>
+            <a:off x="7200401" y="6457547"/>
             <a:ext cx="1516543" cy="321981"/>
           </a:xfrm>
           <a:prstGeom prst="roundRect">
@@ -6938,7 +6546,7 @@
         </p:nvSpPr>
         <p:spPr>
           <a:xfrm>
-            <a:off x="7224994" y="7485527"/>
+            <a:off x="7214397" y="6849004"/>
             <a:ext cx="1516543" cy="321981"/>
           </a:xfrm>
           <a:prstGeom prst="roundRect">

</xml_diff>

<commit_message>
Some doc updates, including dropping parking location choice since it has yet to be implemented and adding a draft estimation functionality flow chart
</commit_message>
<xml_diff>
--- a/docs/images/abmexample.pptx
+++ b/docs/images/abmexample.pptx
@@ -197,7 +197,7 @@
           <a:p>
             <a:fld id="{CB0FEEBC-9D12-43CB-BEF3-A9ED6ACE25C3}" type="datetimeFigureOut">
               <a:rPr lang="en-US" smtClean="0"/>
-              <a:t>7/15/2018</a:t>
+              <a:t>5/12/2020</a:t>
             </a:fld>
             <a:endParaRPr lang="en-US"/>
           </a:p>
@@ -679,7 +679,7 @@
           <a:p>
             <a:fld id="{0DECCE1E-41C5-476A-AB8D-4C2AE2DBCC24}" type="datetimeFigureOut">
               <a:rPr lang="en-US" smtClean="0"/>
-              <a:t>7/15/2018</a:t>
+              <a:t>5/12/2020</a:t>
             </a:fld>
             <a:endParaRPr lang="en-US"/>
           </a:p>
@@ -849,7 +849,7 @@
           <a:p>
             <a:fld id="{0DECCE1E-41C5-476A-AB8D-4C2AE2DBCC24}" type="datetimeFigureOut">
               <a:rPr lang="en-US" smtClean="0"/>
-              <a:t>7/15/2018</a:t>
+              <a:t>5/12/2020</a:t>
             </a:fld>
             <a:endParaRPr lang="en-US"/>
           </a:p>
@@ -1029,7 +1029,7 @@
           <a:p>
             <a:fld id="{0DECCE1E-41C5-476A-AB8D-4C2AE2DBCC24}" type="datetimeFigureOut">
               <a:rPr lang="en-US" smtClean="0"/>
-              <a:t>7/15/2018</a:t>
+              <a:t>5/12/2020</a:t>
             </a:fld>
             <a:endParaRPr lang="en-US"/>
           </a:p>
@@ -1199,7 +1199,7 @@
           <a:p>
             <a:fld id="{0DECCE1E-41C5-476A-AB8D-4C2AE2DBCC24}" type="datetimeFigureOut">
               <a:rPr lang="en-US" smtClean="0"/>
-              <a:t>7/15/2018</a:t>
+              <a:t>5/12/2020</a:t>
             </a:fld>
             <a:endParaRPr lang="en-US"/>
           </a:p>
@@ -1443,7 +1443,7 @@
           <a:p>
             <a:fld id="{0DECCE1E-41C5-476A-AB8D-4C2AE2DBCC24}" type="datetimeFigureOut">
               <a:rPr lang="en-US" smtClean="0"/>
-              <a:t>7/15/2018</a:t>
+              <a:t>5/12/2020</a:t>
             </a:fld>
             <a:endParaRPr lang="en-US"/>
           </a:p>
@@ -1675,7 +1675,7 @@
           <a:p>
             <a:fld id="{0DECCE1E-41C5-476A-AB8D-4C2AE2DBCC24}" type="datetimeFigureOut">
               <a:rPr lang="en-US" smtClean="0"/>
-              <a:t>7/15/2018</a:t>
+              <a:t>5/12/2020</a:t>
             </a:fld>
             <a:endParaRPr lang="en-US"/>
           </a:p>
@@ -2042,7 +2042,7 @@
           <a:p>
             <a:fld id="{0DECCE1E-41C5-476A-AB8D-4C2AE2DBCC24}" type="datetimeFigureOut">
               <a:rPr lang="en-US" smtClean="0"/>
-              <a:t>7/15/2018</a:t>
+              <a:t>5/12/2020</a:t>
             </a:fld>
             <a:endParaRPr lang="en-US"/>
           </a:p>
@@ -2160,7 +2160,7 @@
           <a:p>
             <a:fld id="{0DECCE1E-41C5-476A-AB8D-4C2AE2DBCC24}" type="datetimeFigureOut">
               <a:rPr lang="en-US" smtClean="0"/>
-              <a:t>7/15/2018</a:t>
+              <a:t>5/12/2020</a:t>
             </a:fld>
             <a:endParaRPr lang="en-US"/>
           </a:p>
@@ -2255,7 +2255,7 @@
           <a:p>
             <a:fld id="{0DECCE1E-41C5-476A-AB8D-4C2AE2DBCC24}" type="datetimeFigureOut">
               <a:rPr lang="en-US" smtClean="0"/>
-              <a:t>7/15/2018</a:t>
+              <a:t>5/12/2020</a:t>
             </a:fld>
             <a:endParaRPr lang="en-US"/>
           </a:p>
@@ -2532,7 +2532,7 @@
           <a:p>
             <a:fld id="{0DECCE1E-41C5-476A-AB8D-4C2AE2DBCC24}" type="datetimeFigureOut">
               <a:rPr lang="en-US" smtClean="0"/>
-              <a:t>7/15/2018</a:t>
+              <a:t>5/12/2020</a:t>
             </a:fld>
             <a:endParaRPr lang="en-US"/>
           </a:p>
@@ -2789,7 +2789,7 @@
           <a:p>
             <a:fld id="{0DECCE1E-41C5-476A-AB8D-4C2AE2DBCC24}" type="datetimeFigureOut">
               <a:rPr lang="en-US" smtClean="0"/>
-              <a:t>7/15/2018</a:t>
+              <a:t>5/12/2020</a:t>
             </a:fld>
             <a:endParaRPr lang="en-US"/>
           </a:p>
@@ -3002,7 +3002,7 @@
           <a:p>
             <a:fld id="{0DECCE1E-41C5-476A-AB8D-4C2AE2DBCC24}" type="datetimeFigureOut">
               <a:rPr lang="en-US" smtClean="0"/>
-              <a:t>7/15/2018</a:t>
+              <a:t>5/12/2020</a:t>
             </a:fld>
             <a:endParaRPr lang="en-US"/>
           </a:p>
@@ -6197,7 +6197,7 @@
             <a:pPr algn="ctr"/>
             <a:r>
               <a:rPr lang="en-US" sz="1200" b="1" dirty="0"/>
-              <a:t>CBD Parking</a:t>
+              <a:t>Write Trip Matrices</a:t>
             </a:r>
           </a:p>
         </p:txBody>

</xml_diff>

<commit_message>
major work on phase 5 (#325)
* estimation through atwork_subtour_mode_choice

* Tnc updates and notebooks (#18)

* move other resources into folder since examples now part of package as well

* add shapefile

* clean up folder setup

* estimation notebooks for larch (#19)

* multiprocessing related logging and error checking

* trip_destination handle all trips fail

* skim caching with numpy memmap to speed skim loading

* better chunking in vectorize_tour_scheduling

* Cli (#22)

* use activitysim_resources

Fixed auto sufficiency conditions in tour_mode_choice.csv. (Issue #324)

* increment to version 0.9.5

* correct write trip matrices sampling expansion and add vehicle occupancy to the expression file

* updates to documentation for phase 5 work except multiple zone systems
</commit_message>
<xml_diff>
--- a/docs/images/abmexample.pptx
+++ b/docs/images/abmexample.pptx
@@ -197,7 +197,7 @@
           <a:p>
             <a:fld id="{CB0FEEBC-9D12-43CB-BEF3-A9ED6ACE25C3}" type="datetimeFigureOut">
               <a:rPr lang="en-US" smtClean="0"/>
-              <a:t>7/15/2018</a:t>
+              <a:t>5/12/2020</a:t>
             </a:fld>
             <a:endParaRPr lang="en-US"/>
           </a:p>
@@ -679,7 +679,7 @@
           <a:p>
             <a:fld id="{0DECCE1E-41C5-476A-AB8D-4C2AE2DBCC24}" type="datetimeFigureOut">
               <a:rPr lang="en-US" smtClean="0"/>
-              <a:t>7/15/2018</a:t>
+              <a:t>5/12/2020</a:t>
             </a:fld>
             <a:endParaRPr lang="en-US"/>
           </a:p>
@@ -849,7 +849,7 @@
           <a:p>
             <a:fld id="{0DECCE1E-41C5-476A-AB8D-4C2AE2DBCC24}" type="datetimeFigureOut">
               <a:rPr lang="en-US" smtClean="0"/>
-              <a:t>7/15/2018</a:t>
+              <a:t>5/12/2020</a:t>
             </a:fld>
             <a:endParaRPr lang="en-US"/>
           </a:p>
@@ -1029,7 +1029,7 @@
           <a:p>
             <a:fld id="{0DECCE1E-41C5-476A-AB8D-4C2AE2DBCC24}" type="datetimeFigureOut">
               <a:rPr lang="en-US" smtClean="0"/>
-              <a:t>7/15/2018</a:t>
+              <a:t>5/12/2020</a:t>
             </a:fld>
             <a:endParaRPr lang="en-US"/>
           </a:p>
@@ -1199,7 +1199,7 @@
           <a:p>
             <a:fld id="{0DECCE1E-41C5-476A-AB8D-4C2AE2DBCC24}" type="datetimeFigureOut">
               <a:rPr lang="en-US" smtClean="0"/>
-              <a:t>7/15/2018</a:t>
+              <a:t>5/12/2020</a:t>
             </a:fld>
             <a:endParaRPr lang="en-US"/>
           </a:p>
@@ -1443,7 +1443,7 @@
           <a:p>
             <a:fld id="{0DECCE1E-41C5-476A-AB8D-4C2AE2DBCC24}" type="datetimeFigureOut">
               <a:rPr lang="en-US" smtClean="0"/>
-              <a:t>7/15/2018</a:t>
+              <a:t>5/12/2020</a:t>
             </a:fld>
             <a:endParaRPr lang="en-US"/>
           </a:p>
@@ -1675,7 +1675,7 @@
           <a:p>
             <a:fld id="{0DECCE1E-41C5-476A-AB8D-4C2AE2DBCC24}" type="datetimeFigureOut">
               <a:rPr lang="en-US" smtClean="0"/>
-              <a:t>7/15/2018</a:t>
+              <a:t>5/12/2020</a:t>
             </a:fld>
             <a:endParaRPr lang="en-US"/>
           </a:p>
@@ -2042,7 +2042,7 @@
           <a:p>
             <a:fld id="{0DECCE1E-41C5-476A-AB8D-4C2AE2DBCC24}" type="datetimeFigureOut">
               <a:rPr lang="en-US" smtClean="0"/>
-              <a:t>7/15/2018</a:t>
+              <a:t>5/12/2020</a:t>
             </a:fld>
             <a:endParaRPr lang="en-US"/>
           </a:p>
@@ -2160,7 +2160,7 @@
           <a:p>
             <a:fld id="{0DECCE1E-41C5-476A-AB8D-4C2AE2DBCC24}" type="datetimeFigureOut">
               <a:rPr lang="en-US" smtClean="0"/>
-              <a:t>7/15/2018</a:t>
+              <a:t>5/12/2020</a:t>
             </a:fld>
             <a:endParaRPr lang="en-US"/>
           </a:p>
@@ -2255,7 +2255,7 @@
           <a:p>
             <a:fld id="{0DECCE1E-41C5-476A-AB8D-4C2AE2DBCC24}" type="datetimeFigureOut">
               <a:rPr lang="en-US" smtClean="0"/>
-              <a:t>7/15/2018</a:t>
+              <a:t>5/12/2020</a:t>
             </a:fld>
             <a:endParaRPr lang="en-US"/>
           </a:p>
@@ -2532,7 +2532,7 @@
           <a:p>
             <a:fld id="{0DECCE1E-41C5-476A-AB8D-4C2AE2DBCC24}" type="datetimeFigureOut">
               <a:rPr lang="en-US" smtClean="0"/>
-              <a:t>7/15/2018</a:t>
+              <a:t>5/12/2020</a:t>
             </a:fld>
             <a:endParaRPr lang="en-US"/>
           </a:p>
@@ -2789,7 +2789,7 @@
           <a:p>
             <a:fld id="{0DECCE1E-41C5-476A-AB8D-4C2AE2DBCC24}" type="datetimeFigureOut">
               <a:rPr lang="en-US" smtClean="0"/>
-              <a:t>7/15/2018</a:t>
+              <a:t>5/12/2020</a:t>
             </a:fld>
             <a:endParaRPr lang="en-US"/>
           </a:p>
@@ -3002,7 +3002,7 @@
           <a:p>
             <a:fld id="{0DECCE1E-41C5-476A-AB8D-4C2AE2DBCC24}" type="datetimeFigureOut">
               <a:rPr lang="en-US" smtClean="0"/>
-              <a:t>7/15/2018</a:t>
+              <a:t>5/12/2020</a:t>
             </a:fld>
             <a:endParaRPr lang="en-US"/>
           </a:p>
@@ -6197,7 +6197,7 @@
             <a:pPr algn="ctr"/>
             <a:r>
               <a:rPr lang="en-US" sz="1200" b="1" dirty="0"/>
-              <a:t>CBD Parking</a:t>
+              <a:t>Write Trip Matrices</a:t>
             </a:r>
           </a:p>
         </p:txBody>

</xml_diff>